<commit_message>
made the QR stuff large enough to scan
</commit_message>
<xml_diff>
--- a/Documentation/Using the QRhomework system for students v2.pptx
+++ b/Documentation/Using the QRhomework system for students v2.pptx
@@ -275,7 +275,7 @@
           <a:p>
             <a:fld id="{25F5B746-535C-41E5-868E-EAF5919E6C32}" type="datetimeFigureOut">
               <a:rPr lang="en-US" smtClean="0"/>
-              <a:t>12/31/2019</a:t>
+              <a:t>1/5/2020</a:t>
             </a:fld>
             <a:endParaRPr lang="en-US"/>
           </a:p>
@@ -473,7 +473,7 @@
           <a:p>
             <a:fld id="{25F5B746-535C-41E5-868E-EAF5919E6C32}" type="datetimeFigureOut">
               <a:rPr lang="en-US" smtClean="0"/>
-              <a:t>12/31/2019</a:t>
+              <a:t>1/5/2020</a:t>
             </a:fld>
             <a:endParaRPr lang="en-US"/>
           </a:p>
@@ -681,7 +681,7 @@
           <a:p>
             <a:fld id="{25F5B746-535C-41E5-868E-EAF5919E6C32}" type="datetimeFigureOut">
               <a:rPr lang="en-US" smtClean="0"/>
-              <a:t>12/31/2019</a:t>
+              <a:t>1/5/2020</a:t>
             </a:fld>
             <a:endParaRPr lang="en-US"/>
           </a:p>
@@ -879,7 +879,7 @@
           <a:p>
             <a:fld id="{25F5B746-535C-41E5-868E-EAF5919E6C32}" type="datetimeFigureOut">
               <a:rPr lang="en-US" smtClean="0"/>
-              <a:t>12/31/2019</a:t>
+              <a:t>1/5/2020</a:t>
             </a:fld>
             <a:endParaRPr lang="en-US"/>
           </a:p>
@@ -1154,7 +1154,7 @@
           <a:p>
             <a:fld id="{25F5B746-535C-41E5-868E-EAF5919E6C32}" type="datetimeFigureOut">
               <a:rPr lang="en-US" smtClean="0"/>
-              <a:t>12/31/2019</a:t>
+              <a:t>1/5/2020</a:t>
             </a:fld>
             <a:endParaRPr lang="en-US"/>
           </a:p>
@@ -1419,7 +1419,7 @@
           <a:p>
             <a:fld id="{25F5B746-535C-41E5-868E-EAF5919E6C32}" type="datetimeFigureOut">
               <a:rPr lang="en-US" smtClean="0"/>
-              <a:t>12/31/2019</a:t>
+              <a:t>1/5/2020</a:t>
             </a:fld>
             <a:endParaRPr lang="en-US"/>
           </a:p>
@@ -1831,7 +1831,7 @@
           <a:p>
             <a:fld id="{25F5B746-535C-41E5-868E-EAF5919E6C32}" type="datetimeFigureOut">
               <a:rPr lang="en-US" smtClean="0"/>
-              <a:t>12/31/2019</a:t>
+              <a:t>1/5/2020</a:t>
             </a:fld>
             <a:endParaRPr lang="en-US"/>
           </a:p>
@@ -1972,7 +1972,7 @@
           <a:p>
             <a:fld id="{25F5B746-535C-41E5-868E-EAF5919E6C32}" type="datetimeFigureOut">
               <a:rPr lang="en-US" smtClean="0"/>
-              <a:t>12/31/2019</a:t>
+              <a:t>1/5/2020</a:t>
             </a:fld>
             <a:endParaRPr lang="en-US"/>
           </a:p>
@@ -2085,7 +2085,7 @@
           <a:p>
             <a:fld id="{25F5B746-535C-41E5-868E-EAF5919E6C32}" type="datetimeFigureOut">
               <a:rPr lang="en-US" smtClean="0"/>
-              <a:t>12/31/2019</a:t>
+              <a:t>1/5/2020</a:t>
             </a:fld>
             <a:endParaRPr lang="en-US"/>
           </a:p>
@@ -2396,7 +2396,7 @@
           <a:p>
             <a:fld id="{25F5B746-535C-41E5-868E-EAF5919E6C32}" type="datetimeFigureOut">
               <a:rPr lang="en-US" smtClean="0"/>
-              <a:t>12/31/2019</a:t>
+              <a:t>1/5/2020</a:t>
             </a:fld>
             <a:endParaRPr lang="en-US"/>
           </a:p>
@@ -2684,7 +2684,7 @@
           <a:p>
             <a:fld id="{25F5B746-535C-41E5-868E-EAF5919E6C32}" type="datetimeFigureOut">
               <a:rPr lang="en-US" smtClean="0"/>
-              <a:t>12/31/2019</a:t>
+              <a:t>1/5/2020</a:t>
             </a:fld>
             <a:endParaRPr lang="en-US"/>
           </a:p>
@@ -2925,7 +2925,7 @@
           <a:p>
             <a:fld id="{25F5B746-535C-41E5-868E-EAF5919E6C32}" type="datetimeFigureOut">
               <a:rPr lang="en-US" smtClean="0"/>
-              <a:t>12/31/2019</a:t>
+              <a:t>1/5/2020</a:t>
             </a:fld>
             <a:endParaRPr lang="en-US"/>
           </a:p>
@@ -3440,7 +3440,7 @@
           <a:p>
             <a:r>
               <a:rPr lang="en-US" sz="2400" dirty="0"/>
-              <a:t>The quick response homework system is being developed to give you relevant practice on numerical concepts.  This system is free to use and is still under construction so suggestions on improving they system will always be appreciated.  Unlike systems you may have used in the past, </a:t>
+              <a:t>The quick response homework system is being developed to give you relevant practice on numerical concepts.  This system is free to use and is still under construction so suggestions on improving the system are appreciated.  Unlike systems you may have used in the past, </a:t>
             </a:r>
             <a:r>
               <a:rPr lang="en-US" sz="2400" dirty="0" err="1"/>
@@ -3460,15 +3460,7 @@
             </a:r>
             <a:r>
               <a:rPr lang="en-US" sz="2400" dirty="0"/>
-              <a:t>and work it as you would a problem from </a:t>
-            </a:r>
-            <a:r>
-              <a:rPr lang="en-US" sz="2400"/>
-              <a:t>a textbook.  </a:t>
-            </a:r>
-            <a:r>
-              <a:rPr lang="en-US" sz="2400" dirty="0"/>
-              <a:t>You can check you answer on your phone or computer.  If you get stuck, you may try working the base-case problem.  You are provided the answers to the basecase problem.  Questions also come with reflections that your instructor may assign.  </a:t>
+              <a:t>and work it as you would a problem from a textbook.  You can check your answers on your phone or computer.  If you get stuck, you may try working the base-case problem.  You are provided the answers to the basecase problem.  Questions also come with reflections that your instructor may assign.  </a:t>
             </a:r>
           </a:p>
         </p:txBody>
@@ -3709,7 +3701,7 @@
                   <a:srgbClr val="FFFF00"/>
                 </a:highlight>
               </a:rPr>
-              <a:t>Please Note this – if it the problem does not fully load is will have markup like ##mdot,num,20## in the statement</a:t>
+              <a:t>Please Note this – if it the problem does not fully load it will have markups like ##mdot,num,20## in the statement</a:t>
             </a:r>
           </a:p>
         </p:txBody>
@@ -3744,7 +3736,7 @@
           <a:p>
             <a:r>
               <a:rPr lang="en-US" dirty="0"/>
-              <a:t>In your Browser Chrome is recommended) Type:  </a:t>
+              <a:t>In your Browser (Chrome is recommended) Type:  </a:t>
             </a:r>
             <a:r>
               <a:rPr lang="en-US" sz="3200" dirty="0"/>
@@ -3854,7 +3846,19 @@
             </a:br>
             <a:r>
               <a:rPr lang="en-US" sz="3200" dirty="0"/>
-              <a:t>You can print this out with Ctrl P on most browsers </a:t>
+              <a:t>You can print this out with </a:t>
+            </a:r>
+            <a:r>
+              <a:rPr lang="en-US" sz="3200" u="sng" dirty="0">
+                <a:solidFill>
+                  <a:srgbClr val="FF0000"/>
+                </a:solidFill>
+              </a:rPr>
+              <a:t>Ctrl P</a:t>
+            </a:r>
+            <a:r>
+              <a:rPr lang="en-US" sz="3200" dirty="0"/>
+              <a:t> on most browsers </a:t>
             </a:r>
           </a:p>
         </p:txBody>
@@ -4173,7 +4177,7 @@
                 <a:latin typeface="Arial" panose="020B0604020202020204" pitchFamily="34" charset="0"/>
                 <a:cs typeface="Arial" panose="020B0604020202020204" pitchFamily="34" charset="0"/>
               </a:rPr>
-              <a:t>The Base Case is the Same for All Students</a:t>
+              <a:t>The Base-Case is the Same for All Students</a:t>
             </a:r>
             <a:br>
               <a:rPr lang="en-US" dirty="0">
@@ -4471,7 +4475,7 @@
                   <a:srgbClr val="C00000"/>
                 </a:solidFill>
               </a:rPr>
-              <a:t>You can check each part of your answer as many times as you like without penalty – however the system will slow after to many guesses</a:t>
+              <a:t>You can check each part of your answer as many times as you like without penalty – however the system will slow after several incorrect tries</a:t>
             </a:r>
           </a:p>
         </p:txBody>
@@ -4530,6 +4534,55 @@
         <p:spPr>
           <a:xfrm rot="20775924">
             <a:off x="4060166" y="2300377"/>
+            <a:ext cx="1880559" cy="477329"/>
+          </a:xfrm>
+          <a:prstGeom prst="leftArrow">
+            <a:avLst/>
+          </a:prstGeom>
+          <a:solidFill>
+            <a:srgbClr val="C00000"/>
+          </a:solidFill>
+        </p:spPr>
+        <p:style>
+          <a:lnRef idx="2">
+            <a:schemeClr val="accent1">
+              <a:shade val="50000"/>
+            </a:schemeClr>
+          </a:lnRef>
+          <a:fillRef idx="1">
+            <a:schemeClr val="accent1"/>
+          </a:fillRef>
+          <a:effectRef idx="0">
+            <a:schemeClr val="accent1"/>
+          </a:effectRef>
+          <a:fontRef idx="minor">
+            <a:schemeClr val="lt1"/>
+          </a:fontRef>
+        </p:style>
+        <p:txBody>
+          <a:bodyPr rtlCol="0" anchor="ctr"/>
+          <a:lstStyle/>
+          <a:p>
+            <a:pPr algn="ctr"/>
+            <a:endParaRPr lang="en-US"/>
+          </a:p>
+        </p:txBody>
+      </p:sp>
+      <p:sp>
+        <p:nvSpPr>
+          <p:cNvPr id="7" name="Arrow: Left 6">
+            <a:extLst>
+              <a:ext uri="{FF2B5EF4-FFF2-40B4-BE49-F238E27FC236}">
+                <a16:creationId xmlns:a16="http://schemas.microsoft.com/office/drawing/2014/main" id="{3537925F-C78F-47B2-9707-6B3A485D950D}"/>
+              </a:ext>
+            </a:extLst>
+          </p:cNvPr>
+          <p:cNvSpPr/>
+          <p:nvPr/>
+        </p:nvSpPr>
+        <p:spPr>
+          <a:xfrm>
+            <a:off x="4618006" y="5606585"/>
             <a:ext cx="1880559" cy="477329"/>
           </a:xfrm>
           <a:prstGeom prst="leftArrow">

</xml_diff>